<commit_message>
ppt-template_16-9: add section title & align line
</commit_message>
<xml_diff>
--- a/meeting/reading-club/ppt-template_16-9.pptx
+++ b/meeting/reading-club/ppt-template_16-9.pptx
@@ -6,31 +6,31 @@
   </p:sldMasterIdLst>
   <p:sldIdLst>
     <p:sldId id="256" r:id="rId2"/>
-    <p:sldId id="258" r:id="rId3"/>
-    <p:sldId id="259" r:id="rId4"/>
-    <p:sldId id="260" r:id="rId5"/>
+    <p:sldId id="261" r:id="rId3"/>
+    <p:sldId id="262" r:id="rId4"/>
+    <p:sldId id="263" r:id="rId5"/>
   </p:sldIdLst>
   <p:sldSz cx="12192000" cy="6858000"/>
   <p:notesSz cx="6858000" cy="9144000"/>
   <p:embeddedFontLst>
     <p:embeddedFont>
-      <p:font typeface="游ゴシック" panose="020B0400000000000000" pitchFamily="50" charset="-128"/>
+      <p:font typeface="Segoe UI" panose="020B0502040204020203" pitchFamily="34" charset="0"/>
       <p:regular r:id="rId6"/>
       <p:bold r:id="rId7"/>
-    </p:embeddedFont>
-    <p:embeddedFont>
-      <p:font typeface="Segoe UI" panose="020B0502040204020203" pitchFamily="34" charset="0"/>
-      <p:regular r:id="rId8"/>
-      <p:bold r:id="rId9"/>
-      <p:italic r:id="rId10"/>
-      <p:boldItalic r:id="rId11"/>
+      <p:italic r:id="rId8"/>
+      <p:boldItalic r:id="rId9"/>
     </p:embeddedFont>
     <p:embeddedFont>
       <p:font typeface="メイリオ" panose="020B0604030504040204" pitchFamily="50" charset="-128"/>
-      <p:regular r:id="rId12"/>
-      <p:bold r:id="rId13"/>
-      <p:italic r:id="rId14"/>
-      <p:boldItalic r:id="rId15"/>
+      <p:regular r:id="rId10"/>
+      <p:bold r:id="rId11"/>
+      <p:italic r:id="rId12"/>
+      <p:boldItalic r:id="rId13"/>
+    </p:embeddedFont>
+    <p:embeddedFont>
+      <p:font typeface="游ゴシック" panose="020B0400000000000000" pitchFamily="50" charset="-128"/>
+      <p:regular r:id="rId14"/>
+      <p:bold r:id="rId15"/>
     </p:embeddedFont>
   </p:embeddedFontLst>
   <p:defaultTextStyle>
@@ -134,9 +134,9 @@
         <p14:section name="既定のセクション" id="{345DD93F-A9E5-4A0E-9152-32CB7935D669}">
           <p14:sldIdLst>
             <p14:sldId id="256"/>
-            <p14:sldId id="258"/>
-            <p14:sldId id="259"/>
-            <p14:sldId id="260"/>
+            <p14:sldId id="261"/>
+            <p14:sldId id="262"/>
+            <p14:sldId id="263"/>
           </p14:sldIdLst>
         </p14:section>
         <p14:section name="予備スライド" id="{77113547-4A9F-4F54-B34D-24818CF0DC8C}">
@@ -432,7 +432,7 @@
           <a:p>
             <a:fld id="{1D05365D-45E7-44A0-87EE-3ACBB8194AED}" type="datetimeFigureOut">
               <a:rPr kumimoji="1" lang="ja-JP" altLang="en-US" smtClean="0"/>
-              <a:t>2021/6/2</a:t>
+              <a:t>2021/6/3</a:t>
             </a:fld>
             <a:endParaRPr kumimoji="1" lang="ja-JP" altLang="en-US"/>
           </a:p>
@@ -668,7 +668,7 @@
           <a:p>
             <a:fld id="{1D05365D-45E7-44A0-87EE-3ACBB8194AED}" type="datetimeFigureOut">
               <a:rPr kumimoji="1" lang="ja-JP" altLang="en-US" smtClean="0"/>
-              <a:t>2021/6/2</a:t>
+              <a:t>2021/6/3</a:t>
             </a:fld>
             <a:endParaRPr kumimoji="1" lang="ja-JP" altLang="en-US"/>
           </a:p>
@@ -1010,7 +1010,7 @@
 </file>
 
 <file path=ppt/slideLayouts/slideLayout2.xml><?xml version="1.0" encoding="utf-8"?>
-<p:sldLayout xmlns:a="http://schemas.openxmlformats.org/drawingml/2006/main" xmlns:r="http://schemas.openxmlformats.org/officeDocument/2006/relationships" xmlns:p="http://schemas.openxmlformats.org/presentationml/2006/main" type="obj" preserve="1">
+<p:sldLayout xmlns:a="http://schemas.openxmlformats.org/drawingml/2006/main" xmlns:r="http://schemas.openxmlformats.org/officeDocument/2006/relationships" xmlns:p="http://schemas.openxmlformats.org/presentationml/2006/main" preserve="1" userDrawn="1">
   <p:cSld name="タイトルとコンテンツ">
     <p:spTree>
       <p:nvGrpSpPr>
@@ -1047,7 +1047,7 @@
           <a:lstStyle/>
           <a:p>
             <a:r>
-              <a:rPr lang="ja-JP" altLang="en-US"/>
+              <a:rPr lang="ja-JP" altLang="en-US" dirty="0"/>
               <a:t>マスター タイトルの書式設定</a:t>
             </a:r>
             <a:endParaRPr lang="en-US" dirty="0"/>
@@ -1072,71 +1072,132 @@
         </p:spPr>
         <p:txBody>
           <a:bodyPr/>
-          <a:lstStyle/>
+          <a:lstStyle>
+            <a:lvl1pPr>
+              <a:lnSpc>
+                <a:spcPct val="130000"/>
+              </a:lnSpc>
+              <a:spcBef>
+                <a:spcPts val="600"/>
+              </a:spcBef>
+              <a:spcAft>
+                <a:spcPts val="600"/>
+              </a:spcAft>
+              <a:defRPr/>
+            </a:lvl1pPr>
+            <a:lvl2pPr>
+              <a:lnSpc>
+                <a:spcPct val="130000"/>
+              </a:lnSpc>
+              <a:spcBef>
+                <a:spcPts val="600"/>
+              </a:spcBef>
+              <a:spcAft>
+                <a:spcPts val="600"/>
+              </a:spcAft>
+              <a:defRPr/>
+            </a:lvl2pPr>
+            <a:lvl3pPr>
+              <a:lnSpc>
+                <a:spcPct val="130000"/>
+              </a:lnSpc>
+              <a:spcBef>
+                <a:spcPts val="600"/>
+              </a:spcBef>
+              <a:spcAft>
+                <a:spcPts val="600"/>
+              </a:spcAft>
+              <a:defRPr/>
+            </a:lvl3pPr>
+            <a:lvl4pPr>
+              <a:lnSpc>
+                <a:spcPct val="130000"/>
+              </a:lnSpc>
+              <a:spcBef>
+                <a:spcPts val="600"/>
+              </a:spcBef>
+              <a:spcAft>
+                <a:spcPts val="600"/>
+              </a:spcAft>
+              <a:defRPr/>
+            </a:lvl4pPr>
+            <a:lvl5pPr>
+              <a:lnSpc>
+                <a:spcPct val="130000"/>
+              </a:lnSpc>
+              <a:spcBef>
+                <a:spcPts val="600"/>
+              </a:spcBef>
+              <a:spcAft>
+                <a:spcPts val="600"/>
+              </a:spcAft>
+              <a:defRPr/>
+            </a:lvl5pPr>
+          </a:lstStyle>
           <a:p>
             <a:pPr lvl="0"/>
             <a:r>
-              <a:rPr lang="ja-JP" altLang="en-US"/>
+              <a:rPr lang="ja-JP" altLang="en-US" dirty="0"/>
               <a:t>マスター テキストの書式設定</a:t>
             </a:r>
           </a:p>
           <a:p>
             <a:pPr lvl="1"/>
             <a:r>
-              <a:rPr lang="ja-JP" altLang="en-US"/>
+              <a:rPr lang="ja-JP" altLang="en-US" dirty="0"/>
               <a:t>第 </a:t>
             </a:r>
             <a:r>
-              <a:rPr lang="en-US" altLang="ja-JP"/>
+              <a:rPr lang="en-US" altLang="ja-JP" dirty="0"/>
               <a:t>2 </a:t>
             </a:r>
             <a:r>
-              <a:rPr lang="ja-JP" altLang="en-US"/>
+              <a:rPr lang="ja-JP" altLang="en-US" dirty="0"/>
               <a:t>レベル</a:t>
             </a:r>
           </a:p>
           <a:p>
             <a:pPr lvl="2"/>
             <a:r>
-              <a:rPr lang="ja-JP" altLang="en-US"/>
+              <a:rPr lang="ja-JP" altLang="en-US" dirty="0"/>
               <a:t>第 </a:t>
             </a:r>
             <a:r>
-              <a:rPr lang="en-US" altLang="ja-JP"/>
+              <a:rPr lang="en-US" altLang="ja-JP" dirty="0"/>
               <a:t>3 </a:t>
             </a:r>
             <a:r>
-              <a:rPr lang="ja-JP" altLang="en-US"/>
+              <a:rPr lang="ja-JP" altLang="en-US" dirty="0"/>
               <a:t>レベル</a:t>
             </a:r>
           </a:p>
           <a:p>
             <a:pPr lvl="3"/>
             <a:r>
-              <a:rPr lang="ja-JP" altLang="en-US"/>
+              <a:rPr lang="ja-JP" altLang="en-US" dirty="0"/>
               <a:t>第 </a:t>
             </a:r>
             <a:r>
-              <a:rPr lang="en-US" altLang="ja-JP"/>
+              <a:rPr lang="en-US" altLang="ja-JP" dirty="0"/>
               <a:t>4 </a:t>
             </a:r>
             <a:r>
-              <a:rPr lang="ja-JP" altLang="en-US"/>
+              <a:rPr lang="ja-JP" altLang="en-US" dirty="0"/>
               <a:t>レベル</a:t>
             </a:r>
           </a:p>
           <a:p>
             <a:pPr lvl="4"/>
             <a:r>
-              <a:rPr lang="ja-JP" altLang="en-US"/>
+              <a:rPr lang="ja-JP" altLang="en-US" dirty="0"/>
               <a:t>第 </a:t>
             </a:r>
             <a:r>
-              <a:rPr lang="en-US" altLang="ja-JP"/>
+              <a:rPr lang="en-US" altLang="ja-JP" dirty="0"/>
               <a:t>5 </a:t>
             </a:r>
             <a:r>
-              <a:rPr lang="ja-JP" altLang="en-US"/>
+              <a:rPr lang="ja-JP" altLang="en-US" dirty="0"/>
               <a:t>レベル</a:t>
             </a:r>
             <a:endParaRPr lang="en-US" dirty="0"/>
@@ -1168,7 +1229,7 @@
           <a:p>
             <a:fld id="{C764DE79-268F-4C1A-8933-263129D2AF90}" type="datetimeFigureOut">
               <a:rPr lang="en-US" dirty="0"/>
-              <a:t>6/2/2021</a:t>
+              <a:t>6/3/2021</a:t>
             </a:fld>
             <a:endParaRPr lang="en-US" dirty="0"/>
           </a:p>
@@ -1229,6 +1290,100 @@
               <a:t>‹#›</a:t>
             </a:fld>
             <a:endParaRPr lang="en-US" dirty="0"/>
+          </a:p>
+        </p:txBody>
+      </p:sp>
+      <p:sp>
+        <p:nvSpPr>
+          <p:cNvPr id="8" name="テキスト プレースホルダー 7">
+            <a:extLst>
+              <a:ext uri="{FF2B5EF4-FFF2-40B4-BE49-F238E27FC236}">
+                <a16:creationId xmlns:a16="http://schemas.microsoft.com/office/drawing/2014/main" id="{5943892C-8E35-4374-9BEA-487FF74CF105}"/>
+              </a:ext>
+            </a:extLst>
+          </p:cNvPr>
+          <p:cNvSpPr>
+            <a:spLocks noGrp="1"/>
+          </p:cNvSpPr>
+          <p:nvPr>
+            <p:ph type="body" sz="quarter" idx="13" hasCustomPrompt="1"/>
+          </p:nvPr>
+        </p:nvSpPr>
+        <p:spPr>
+          <a:xfrm>
+            <a:off x="1" y="42730"/>
+            <a:ext cx="6095999" cy="273465"/>
+          </a:xfrm>
+        </p:spPr>
+        <p:txBody>
+          <a:bodyPr>
+            <a:normAutofit/>
+          </a:bodyPr>
+          <a:lstStyle>
+            <a:lvl1pPr marL="0" indent="0" algn="r">
+              <a:buNone/>
+              <a:defRPr sz="1100">
+                <a:solidFill>
+                  <a:schemeClr val="bg1">
+                    <a:lumMod val="95000"/>
+                  </a:schemeClr>
+                </a:solidFill>
+              </a:defRPr>
+            </a:lvl1pPr>
+          </a:lstStyle>
+          <a:p>
+            <a:pPr lvl="0"/>
+            <a:r>
+              <a:rPr kumimoji="1" lang="ja-JP" altLang="en-US" dirty="0"/>
+              <a:t>節タイトル</a:t>
+            </a:r>
+          </a:p>
+        </p:txBody>
+      </p:sp>
+      <p:sp>
+        <p:nvSpPr>
+          <p:cNvPr id="10" name="テキスト プレースホルダー 7">
+            <a:extLst>
+              <a:ext uri="{FF2B5EF4-FFF2-40B4-BE49-F238E27FC236}">
+                <a16:creationId xmlns:a16="http://schemas.microsoft.com/office/drawing/2014/main" id="{1B717F9B-65F9-4E92-81ED-D906CEA4580D}"/>
+              </a:ext>
+            </a:extLst>
+          </p:cNvPr>
+          <p:cNvSpPr>
+            <a:spLocks noGrp="1"/>
+          </p:cNvSpPr>
+          <p:nvPr>
+            <p:ph type="body" sz="quarter" idx="14" hasCustomPrompt="1"/>
+          </p:nvPr>
+        </p:nvSpPr>
+        <p:spPr>
+          <a:xfrm>
+            <a:off x="6096000" y="42729"/>
+            <a:ext cx="6095999" cy="273465"/>
+          </a:xfrm>
+        </p:spPr>
+        <p:txBody>
+          <a:bodyPr>
+            <a:normAutofit/>
+          </a:bodyPr>
+          <a:lstStyle>
+            <a:lvl1pPr marL="0" indent="0" algn="l">
+              <a:buNone/>
+              <a:defRPr sz="1100">
+                <a:solidFill>
+                  <a:schemeClr val="bg1">
+                    <a:lumMod val="95000"/>
+                  </a:schemeClr>
+                </a:solidFill>
+              </a:defRPr>
+            </a:lvl1pPr>
+          </a:lstStyle>
+          <a:p>
+            <a:pPr lvl="0"/>
+            <a:r>
+              <a:rPr kumimoji="1" lang="ja-JP" altLang="en-US" dirty="0"/>
+              <a:t>小節タイトル</a:t>
+            </a:r>
           </a:p>
         </p:txBody>
       </p:sp>
@@ -1438,7 +1593,7 @@
           <a:p>
             <a:fld id="{1D05365D-45E7-44A0-87EE-3ACBB8194AED}" type="datetimeFigureOut">
               <a:rPr kumimoji="1" lang="ja-JP" altLang="en-US" smtClean="0"/>
-              <a:t>2021/6/2</a:t>
+              <a:t>2021/6/3</a:t>
             </a:fld>
             <a:endParaRPr kumimoji="1" lang="ja-JP" altLang="en-US"/>
           </a:p>
@@ -1758,7 +1913,7 @@
           <a:p>
             <a:fld id="{1D05365D-45E7-44A0-87EE-3ACBB8194AED}" type="datetimeFigureOut">
               <a:rPr kumimoji="1" lang="ja-JP" altLang="en-US" smtClean="0"/>
-              <a:t>2021/6/2</a:t>
+              <a:t>2021/6/3</a:t>
             </a:fld>
             <a:endParaRPr kumimoji="1" lang="ja-JP" altLang="en-US"/>
           </a:p>
@@ -2213,7 +2368,7 @@
           <a:p>
             <a:fld id="{1D05365D-45E7-44A0-87EE-3ACBB8194AED}" type="datetimeFigureOut">
               <a:rPr kumimoji="1" lang="ja-JP" altLang="en-US" smtClean="0"/>
-              <a:t>2021/6/2</a:t>
+              <a:t>2021/6/3</a:t>
             </a:fld>
             <a:endParaRPr kumimoji="1" lang="ja-JP" altLang="en-US"/>
           </a:p>
@@ -2355,7 +2510,7 @@
           <a:p>
             <a:fld id="{1D05365D-45E7-44A0-87EE-3ACBB8194AED}" type="datetimeFigureOut">
               <a:rPr kumimoji="1" lang="ja-JP" altLang="en-US" smtClean="0"/>
-              <a:t>2021/6/2</a:t>
+              <a:t>2021/6/3</a:t>
             </a:fld>
             <a:endParaRPr kumimoji="1" lang="ja-JP" altLang="en-US"/>
           </a:p>
@@ -2474,7 +2629,7 @@
           <a:p>
             <a:fld id="{1D05365D-45E7-44A0-87EE-3ACBB8194AED}" type="datetimeFigureOut">
               <a:rPr kumimoji="1" lang="ja-JP" altLang="en-US" smtClean="0"/>
-              <a:t>2021/6/2</a:t>
+              <a:t>2021/6/3</a:t>
             </a:fld>
             <a:endParaRPr kumimoji="1" lang="ja-JP" altLang="en-US"/>
           </a:p>
@@ -2807,7 +2962,7 @@
           <a:p>
             <a:fld id="{1D05365D-45E7-44A0-87EE-3ACBB8194AED}" type="datetimeFigureOut">
               <a:rPr kumimoji="1" lang="ja-JP" altLang="en-US" smtClean="0"/>
-              <a:t>2021/6/2</a:t>
+              <a:t>2021/6/3</a:t>
             </a:fld>
             <a:endParaRPr kumimoji="1" lang="ja-JP" altLang="en-US"/>
           </a:p>
@@ -3088,7 +3243,7 @@
           <a:p>
             <a:fld id="{1D05365D-45E7-44A0-87EE-3ACBB8194AED}" type="datetimeFigureOut">
               <a:rPr kumimoji="1" lang="ja-JP" altLang="en-US" smtClean="0"/>
-              <a:t>2021/6/2</a:t>
+              <a:t>2021/6/3</a:t>
             </a:fld>
             <a:endParaRPr kumimoji="1" lang="ja-JP" altLang="en-US"/>
           </a:p>
@@ -3945,7 +4100,7 @@
           <a:bodyPr lIns="0" tIns="0" rIns="36000" bIns="0" rtlCol="0" anchor="ctr"/>
           <a:lstStyle/>
           <a:p>
-            <a:pPr marL="0" marR="0" lvl="0" indent="0" algn="ctr" defTabSz="457200" rtl="0" eaLnBrk="1" fontAlgn="ctr" latinLnBrk="0" hangingPunct="1">
+            <a:pPr marL="0" marR="0" lvl="0" indent="0" algn="r" defTabSz="457200" rtl="0" eaLnBrk="1" fontAlgn="ctr" latinLnBrk="0" hangingPunct="1">
               <a:lnSpc>
                 <a:spcPct val="100000"/>
               </a:lnSpc>
@@ -4811,10 +4966,10 @@
       </p:grpSpPr>
       <p:sp>
         <p:nvSpPr>
-          <p:cNvPr id="3" name="タイトル 2">
+          <p:cNvPr id="4" name="テキスト プレースホルダー 3">
             <a:extLst>
               <a:ext uri="{FF2B5EF4-FFF2-40B4-BE49-F238E27FC236}">
-                <a16:creationId xmlns:a16="http://schemas.microsoft.com/office/drawing/2014/main" id="{DC31C4B5-25BF-4BA8-9A13-AD88D72A2DD1}"/>
+                <a16:creationId xmlns:a16="http://schemas.microsoft.com/office/drawing/2014/main" id="{9CA8AF62-1913-4ADA-B91A-81F5D1E7B2C6}"/>
               </a:ext>
             </a:extLst>
           </p:cNvPr>
@@ -4822,7 +4977,7 @@
             <a:spLocks noGrp="1"/>
           </p:cNvSpPr>
           <p:nvPr>
-            <p:ph type="title"/>
+            <p:ph type="body" sz="quarter" idx="13"/>
           </p:nvPr>
         </p:nvSpPr>
         <p:spPr/>
@@ -4830,20 +4985,16 @@
           <a:bodyPr/>
           <a:lstStyle/>
           <a:p>
-            <a:r>
-              <a:rPr lang="ja-JP" altLang="en-US" dirty="0"/>
-              <a:t>目次</a:t>
-            </a:r>
             <a:endParaRPr kumimoji="1" lang="ja-JP" altLang="en-US" dirty="0"/>
           </a:p>
         </p:txBody>
       </p:sp>
       <p:sp>
         <p:nvSpPr>
-          <p:cNvPr id="2" name="コンテンツ プレースホルダー 1">
+          <p:cNvPr id="5" name="テキスト プレースホルダー 4">
             <a:extLst>
               <a:ext uri="{FF2B5EF4-FFF2-40B4-BE49-F238E27FC236}">
-                <a16:creationId xmlns:a16="http://schemas.microsoft.com/office/drawing/2014/main" id="{B6C0F07A-7F21-40A9-A614-BEE5A6C25173}"/>
+                <a16:creationId xmlns:a16="http://schemas.microsoft.com/office/drawing/2014/main" id="{57327DF9-D07D-4228-B32C-3818BBC7A007}"/>
               </a:ext>
             </a:extLst>
           </p:cNvPr>
@@ -4851,10 +5002,74 @@
             <a:spLocks noGrp="1"/>
           </p:cNvSpPr>
           <p:nvPr>
+            <p:ph type="body" sz="quarter" idx="14"/>
+          </p:nvPr>
+        </p:nvSpPr>
+        <p:spPr/>
+        <p:txBody>
+          <a:bodyPr/>
+          <a:lstStyle/>
+          <a:p>
+            <a:endParaRPr kumimoji="1" lang="ja-JP" altLang="en-US"/>
+          </a:p>
+        </p:txBody>
+      </p:sp>
+      <p:sp>
+        <p:nvSpPr>
+          <p:cNvPr id="8" name="タイトル 2">
+            <a:extLst>
+              <a:ext uri="{FF2B5EF4-FFF2-40B4-BE49-F238E27FC236}">
+                <a16:creationId xmlns:a16="http://schemas.microsoft.com/office/drawing/2014/main" id="{888AE9BF-F836-47D1-950A-6C13E6ACE425}"/>
+              </a:ext>
+            </a:extLst>
+          </p:cNvPr>
+          <p:cNvSpPr>
+            <a:spLocks noGrp="1"/>
+          </p:cNvSpPr>
+          <p:nvPr>
+            <p:ph type="title"/>
+          </p:nvPr>
+        </p:nvSpPr>
+        <p:spPr>
+          <a:xfrm>
+            <a:off x="333375" y="363128"/>
+            <a:ext cx="11204785" cy="1325563"/>
+          </a:xfrm>
+        </p:spPr>
+        <p:txBody>
+          <a:bodyPr/>
+          <a:lstStyle/>
+          <a:p>
+            <a:r>
+              <a:rPr lang="ja-JP" altLang="en-US" dirty="0"/>
+              <a:t>目次</a:t>
+            </a:r>
+            <a:endParaRPr kumimoji="1" lang="ja-JP" altLang="en-US" dirty="0"/>
+          </a:p>
+        </p:txBody>
+      </p:sp>
+      <p:sp>
+        <p:nvSpPr>
+          <p:cNvPr id="9" name="コンテンツ プレースホルダー 1">
+            <a:extLst>
+              <a:ext uri="{FF2B5EF4-FFF2-40B4-BE49-F238E27FC236}">
+                <a16:creationId xmlns:a16="http://schemas.microsoft.com/office/drawing/2014/main" id="{5B356C16-A8F1-4F98-8DF6-E8F05D34D9FB}"/>
+              </a:ext>
+            </a:extLst>
+          </p:cNvPr>
+          <p:cNvSpPr>
+            <a:spLocks noGrp="1"/>
+          </p:cNvSpPr>
+          <p:nvPr>
             <p:ph idx="1"/>
           </p:nvPr>
         </p:nvSpPr>
-        <p:spPr/>
+        <p:spPr>
+          <a:xfrm>
+            <a:off x="704850" y="1688691"/>
+            <a:ext cx="10833310" cy="4486275"/>
+          </a:xfrm>
+        </p:spPr>
         <p:txBody>
           <a:bodyPr/>
           <a:lstStyle/>
@@ -4879,7 +5094,7 @@
     </p:spTree>
     <p:extLst>
       <p:ext uri="{BB962C8B-B14F-4D97-AF65-F5344CB8AC3E}">
-        <p14:creationId xmlns:p14="http://schemas.microsoft.com/office/powerpoint/2010/main" val="1137663456"/>
+        <p14:creationId xmlns:p14="http://schemas.microsoft.com/office/powerpoint/2010/main" val="3267689342"/>
       </p:ext>
     </p:extLst>
   </p:cSld>
@@ -4908,10 +5123,10 @@
       </p:grpSpPr>
       <p:sp>
         <p:nvSpPr>
-          <p:cNvPr id="3" name="タイトル 2">
+          <p:cNvPr id="2" name="タイトル 1">
             <a:extLst>
               <a:ext uri="{FF2B5EF4-FFF2-40B4-BE49-F238E27FC236}">
-                <a16:creationId xmlns:a16="http://schemas.microsoft.com/office/drawing/2014/main" id="{A5C7A5AA-1EF8-4BCF-8B91-C390E44BECED}"/>
+                <a16:creationId xmlns:a16="http://schemas.microsoft.com/office/drawing/2014/main" id="{656FF4D7-9C3E-4DE7-9AAC-60448D5D67E7}"/>
               </a:ext>
             </a:extLst>
           </p:cNvPr>
@@ -4933,10 +5148,10 @@
       </p:sp>
       <p:sp>
         <p:nvSpPr>
-          <p:cNvPr id="2" name="コンテンツ プレースホルダー 1">
+          <p:cNvPr id="3" name="コンテンツ プレースホルダー 2">
             <a:extLst>
               <a:ext uri="{FF2B5EF4-FFF2-40B4-BE49-F238E27FC236}">
-                <a16:creationId xmlns:a16="http://schemas.microsoft.com/office/drawing/2014/main" id="{40121DF9-F8F9-4BEE-9818-0986434D25F9}"/>
+                <a16:creationId xmlns:a16="http://schemas.microsoft.com/office/drawing/2014/main" id="{7A71678A-F0D4-418A-83DA-47F013E34C85}"/>
               </a:ext>
             </a:extLst>
           </p:cNvPr>
@@ -4952,14 +5167,64 @@
           <a:bodyPr/>
           <a:lstStyle/>
           <a:p>
-            <a:endParaRPr kumimoji="1" lang="ja-JP" altLang="en-US" dirty="0"/>
+            <a:endParaRPr kumimoji="1" lang="ja-JP" altLang="en-US"/>
+          </a:p>
+        </p:txBody>
+      </p:sp>
+      <p:sp>
+        <p:nvSpPr>
+          <p:cNvPr id="4" name="テキスト プレースホルダー 3">
+            <a:extLst>
+              <a:ext uri="{FF2B5EF4-FFF2-40B4-BE49-F238E27FC236}">
+                <a16:creationId xmlns:a16="http://schemas.microsoft.com/office/drawing/2014/main" id="{03442CD8-19A4-4915-90BA-6EB4F826DEC9}"/>
+              </a:ext>
+            </a:extLst>
+          </p:cNvPr>
+          <p:cNvSpPr>
+            <a:spLocks noGrp="1"/>
+          </p:cNvSpPr>
+          <p:nvPr>
+            <p:ph type="body" sz="quarter" idx="13"/>
+          </p:nvPr>
+        </p:nvSpPr>
+        <p:spPr/>
+        <p:txBody>
+          <a:bodyPr/>
+          <a:lstStyle/>
+          <a:p>
+            <a:endParaRPr kumimoji="1" lang="ja-JP" altLang="en-US"/>
+          </a:p>
+        </p:txBody>
+      </p:sp>
+      <p:sp>
+        <p:nvSpPr>
+          <p:cNvPr id="5" name="テキスト プレースホルダー 4">
+            <a:extLst>
+              <a:ext uri="{FF2B5EF4-FFF2-40B4-BE49-F238E27FC236}">
+                <a16:creationId xmlns:a16="http://schemas.microsoft.com/office/drawing/2014/main" id="{CC0DE4DD-CBFF-4C58-8C6B-794A5C730427}"/>
+              </a:ext>
+            </a:extLst>
+          </p:cNvPr>
+          <p:cNvSpPr>
+            <a:spLocks noGrp="1"/>
+          </p:cNvSpPr>
+          <p:nvPr>
+            <p:ph type="body" sz="quarter" idx="14"/>
+          </p:nvPr>
+        </p:nvSpPr>
+        <p:spPr/>
+        <p:txBody>
+          <a:bodyPr/>
+          <a:lstStyle/>
+          <a:p>
+            <a:endParaRPr kumimoji="1" lang="ja-JP" altLang="en-US"/>
           </a:p>
         </p:txBody>
       </p:sp>
     </p:spTree>
     <p:extLst>
       <p:ext uri="{BB962C8B-B14F-4D97-AF65-F5344CB8AC3E}">
-        <p14:creationId xmlns:p14="http://schemas.microsoft.com/office/powerpoint/2010/main" val="127735534"/>
+        <p14:creationId xmlns:p14="http://schemas.microsoft.com/office/powerpoint/2010/main" val="1954803380"/>
       </p:ext>
     </p:extLst>
   </p:cSld>
@@ -4988,10 +5253,10 @@
       </p:grpSpPr>
       <p:sp>
         <p:nvSpPr>
-          <p:cNvPr id="3" name="タイトル 2">
+          <p:cNvPr id="2" name="タイトル 1">
             <a:extLst>
               <a:ext uri="{FF2B5EF4-FFF2-40B4-BE49-F238E27FC236}">
-                <a16:creationId xmlns:a16="http://schemas.microsoft.com/office/drawing/2014/main" id="{BB4BC664-9C6B-4F5D-A0F3-81834A042ADB}"/>
+                <a16:creationId xmlns:a16="http://schemas.microsoft.com/office/drawing/2014/main" id="{18F3DB4F-4B86-48C0-BF3A-1EAA8F6589CA}"/>
               </a:ext>
             </a:extLst>
           </p:cNvPr>
@@ -5013,10 +5278,10 @@
       </p:sp>
       <p:sp>
         <p:nvSpPr>
-          <p:cNvPr id="2" name="コンテンツ プレースホルダー 1">
+          <p:cNvPr id="3" name="コンテンツ プレースホルダー 2">
             <a:extLst>
               <a:ext uri="{FF2B5EF4-FFF2-40B4-BE49-F238E27FC236}">
-                <a16:creationId xmlns:a16="http://schemas.microsoft.com/office/drawing/2014/main" id="{F1631062-A366-4A77-A039-417FF92B0433}"/>
+                <a16:creationId xmlns:a16="http://schemas.microsoft.com/office/drawing/2014/main" id="{DA6E10B3-2FF0-4E5B-B201-3705DCFA6C3F}"/>
               </a:ext>
             </a:extLst>
           </p:cNvPr>
@@ -5032,16 +5297,66 @@
           <a:bodyPr/>
           <a:lstStyle/>
           <a:p>
-            <a:endParaRPr kumimoji="1" lang="ja-JP" altLang="en-US" dirty="0"/>
+            <a:endParaRPr kumimoji="1" lang="ja-JP" altLang="en-US"/>
+          </a:p>
+        </p:txBody>
+      </p:sp>
+      <p:sp>
+        <p:nvSpPr>
+          <p:cNvPr id="4" name="テキスト プレースホルダー 3">
+            <a:extLst>
+              <a:ext uri="{FF2B5EF4-FFF2-40B4-BE49-F238E27FC236}">
+                <a16:creationId xmlns:a16="http://schemas.microsoft.com/office/drawing/2014/main" id="{3A8CFDAF-7D68-4C19-8FA7-377A13B4C891}"/>
+              </a:ext>
+            </a:extLst>
+          </p:cNvPr>
+          <p:cNvSpPr>
+            <a:spLocks noGrp="1"/>
+          </p:cNvSpPr>
+          <p:nvPr>
+            <p:ph type="body" sz="quarter" idx="13"/>
+          </p:nvPr>
+        </p:nvSpPr>
+        <p:spPr/>
+        <p:txBody>
+          <a:bodyPr/>
+          <a:lstStyle/>
+          <a:p>
+            <a:endParaRPr kumimoji="1" lang="ja-JP" altLang="en-US"/>
+          </a:p>
+        </p:txBody>
+      </p:sp>
+      <p:sp>
+        <p:nvSpPr>
+          <p:cNvPr id="5" name="テキスト プレースホルダー 4">
+            <a:extLst>
+              <a:ext uri="{FF2B5EF4-FFF2-40B4-BE49-F238E27FC236}">
+                <a16:creationId xmlns:a16="http://schemas.microsoft.com/office/drawing/2014/main" id="{D47EECF1-77DC-4804-9906-601D178E3C93}"/>
+              </a:ext>
+            </a:extLst>
+          </p:cNvPr>
+          <p:cNvSpPr>
+            <a:spLocks noGrp="1"/>
+          </p:cNvSpPr>
+          <p:nvPr>
+            <p:ph type="body" sz="quarter" idx="14"/>
+          </p:nvPr>
+        </p:nvSpPr>
+        <p:spPr/>
+        <p:txBody>
+          <a:bodyPr/>
+          <a:lstStyle/>
+          <a:p>
+            <a:endParaRPr kumimoji="1" lang="ja-JP" altLang="en-US"/>
           </a:p>
         </p:txBody>
       </p:sp>
       <p:grpSp>
         <p:nvGrpSpPr>
-          <p:cNvPr id="4" name="図形グループ 15">
+          <p:cNvPr id="6" name="図形グループ 15">
             <a:extLst>
               <a:ext uri="{FF2B5EF4-FFF2-40B4-BE49-F238E27FC236}">
-                <a16:creationId xmlns:a16="http://schemas.microsoft.com/office/drawing/2014/main" id="{7340510C-3747-4A60-95B5-40564C5DE19F}"/>
+                <a16:creationId xmlns:a16="http://schemas.microsoft.com/office/drawing/2014/main" id="{227EAE9B-427C-4871-9AEC-242F6B4A9FB2}"/>
               </a:ext>
             </a:extLst>
           </p:cNvPr>
@@ -5065,10 +5380,10 @@
         </p:grpSpPr>
         <p:grpSp>
           <p:nvGrpSpPr>
-            <p:cNvPr id="5" name="図形グループ 28">
+            <p:cNvPr id="7" name="図形グループ 28">
               <a:extLst>
                 <a:ext uri="{FF2B5EF4-FFF2-40B4-BE49-F238E27FC236}">
-                  <a16:creationId xmlns:a16="http://schemas.microsoft.com/office/drawing/2014/main" id="{5C3AD775-A576-410A-AB5E-09FA6D2FCC03}"/>
+                  <a16:creationId xmlns:a16="http://schemas.microsoft.com/office/drawing/2014/main" id="{0902CB87-E8E7-4140-BA4C-1E37B7300912}"/>
                 </a:ext>
               </a:extLst>
             </p:cNvPr>
@@ -5085,10 +5400,10 @@
           </p:grpSpPr>
           <p:sp>
             <p:nvSpPr>
-              <p:cNvPr id="7" name="片側の 2 つの角を丸めた四角形 30">
+              <p:cNvPr id="9" name="片側の 2 つの角を丸めた四角形 30">
                 <a:extLst>
                   <a:ext uri="{FF2B5EF4-FFF2-40B4-BE49-F238E27FC236}">
-                    <a16:creationId xmlns:a16="http://schemas.microsoft.com/office/drawing/2014/main" id="{0ECFACF4-343A-47DA-A8E4-D8E1ABFBF10F}"/>
+                    <a16:creationId xmlns:a16="http://schemas.microsoft.com/office/drawing/2014/main" id="{F0CC4C32-00DF-4E28-B510-6D60C017E3B7}"/>
                   </a:ext>
                 </a:extLst>
               </p:cNvPr>
@@ -5157,10 +5472,10 @@
           </p:sp>
           <p:sp>
             <p:nvSpPr>
-              <p:cNvPr id="8" name="片側の 2 つの角を丸めた四角形 31">
+              <p:cNvPr id="10" name="片側の 2 つの角を丸めた四角形 31">
                 <a:extLst>
                   <a:ext uri="{FF2B5EF4-FFF2-40B4-BE49-F238E27FC236}">
-                    <a16:creationId xmlns:a16="http://schemas.microsoft.com/office/drawing/2014/main" id="{E9E9D2F5-F452-43A3-AEBA-9A73A05A71D4}"/>
+                    <a16:creationId xmlns:a16="http://schemas.microsoft.com/office/drawing/2014/main" id="{449FF2A9-0B82-4ACE-8337-31B5DDAEEB04}"/>
                   </a:ext>
                 </a:extLst>
               </p:cNvPr>
@@ -5223,10 +5538,10 @@
         </p:grpSp>
         <p:sp>
           <p:nvSpPr>
-            <p:cNvPr id="6" name="テキスト ボックス 5">
+            <p:cNvPr id="8" name="テキスト ボックス 7">
               <a:extLst>
                 <a:ext uri="{FF2B5EF4-FFF2-40B4-BE49-F238E27FC236}">
-                  <a16:creationId xmlns:a16="http://schemas.microsoft.com/office/drawing/2014/main" id="{AB0FBE37-73BB-49B6-B711-654BDF8BB1BB}"/>
+                  <a16:creationId xmlns:a16="http://schemas.microsoft.com/office/drawing/2014/main" id="{20F270EF-9DF2-4DE4-9B2B-D37515B6C29D}"/>
                 </a:ext>
               </a:extLst>
             </p:cNvPr>
@@ -5277,7 +5592,7 @@
     </p:spTree>
     <p:extLst>
       <p:ext uri="{BB962C8B-B14F-4D97-AF65-F5344CB8AC3E}">
-        <p14:creationId xmlns:p14="http://schemas.microsoft.com/office/powerpoint/2010/main" val="4141687460"/>
+        <p14:creationId xmlns:p14="http://schemas.microsoft.com/office/powerpoint/2010/main" val="1722976555"/>
       </p:ext>
     </p:extLst>
   </p:cSld>

</xml_diff>

<commit_message>
fix ppt-template: rm margin of header & footer
</commit_message>
<xml_diff>
--- a/meeting/reading-club/ppt-template_16-9.pptx
+++ b/meeting/reading-club/ppt-template_16-9.pptx
@@ -432,7 +432,7 @@
           <a:p>
             <a:fld id="{1D05365D-45E7-44A0-87EE-3ACBB8194AED}" type="datetimeFigureOut">
               <a:rPr kumimoji="1" lang="ja-JP" altLang="en-US" smtClean="0"/>
-              <a:t>2021/6/3</a:t>
+              <a:t>2021/6/16</a:t>
             </a:fld>
             <a:endParaRPr kumimoji="1" lang="ja-JP" altLang="en-US"/>
           </a:p>
@@ -668,7 +668,7 @@
           <a:p>
             <a:fld id="{1D05365D-45E7-44A0-87EE-3ACBB8194AED}" type="datetimeFigureOut">
               <a:rPr kumimoji="1" lang="ja-JP" altLang="en-US" smtClean="0"/>
-              <a:t>2021/6/3</a:t>
+              <a:t>2021/6/16</a:t>
             </a:fld>
             <a:endParaRPr kumimoji="1" lang="ja-JP" altLang="en-US"/>
           </a:p>
@@ -1229,7 +1229,7 @@
           <a:p>
             <a:fld id="{C764DE79-268F-4C1A-8933-263129D2AF90}" type="datetimeFigureOut">
               <a:rPr lang="en-US" dirty="0"/>
-              <a:t>6/3/2021</a:t>
+              <a:t>6/16/2021</a:t>
             </a:fld>
             <a:endParaRPr lang="en-US" dirty="0"/>
           </a:p>
@@ -1593,7 +1593,7 @@
           <a:p>
             <a:fld id="{1D05365D-45E7-44A0-87EE-3ACBB8194AED}" type="datetimeFigureOut">
               <a:rPr kumimoji="1" lang="ja-JP" altLang="en-US" smtClean="0"/>
-              <a:t>2021/6/3</a:t>
+              <a:t>2021/6/16</a:t>
             </a:fld>
             <a:endParaRPr kumimoji="1" lang="ja-JP" altLang="en-US"/>
           </a:p>
@@ -1913,7 +1913,7 @@
           <a:p>
             <a:fld id="{1D05365D-45E7-44A0-87EE-3ACBB8194AED}" type="datetimeFigureOut">
               <a:rPr kumimoji="1" lang="ja-JP" altLang="en-US" smtClean="0"/>
-              <a:t>2021/6/3</a:t>
+              <a:t>2021/6/16</a:t>
             </a:fld>
             <a:endParaRPr kumimoji="1" lang="ja-JP" altLang="en-US"/>
           </a:p>
@@ -2368,7 +2368,7 @@
           <a:p>
             <a:fld id="{1D05365D-45E7-44A0-87EE-3ACBB8194AED}" type="datetimeFigureOut">
               <a:rPr kumimoji="1" lang="ja-JP" altLang="en-US" smtClean="0"/>
-              <a:t>2021/6/3</a:t>
+              <a:t>2021/6/16</a:t>
             </a:fld>
             <a:endParaRPr kumimoji="1" lang="ja-JP" altLang="en-US"/>
           </a:p>
@@ -2510,7 +2510,7 @@
           <a:p>
             <a:fld id="{1D05365D-45E7-44A0-87EE-3ACBB8194AED}" type="datetimeFigureOut">
               <a:rPr kumimoji="1" lang="ja-JP" altLang="en-US" smtClean="0"/>
-              <a:t>2021/6/3</a:t>
+              <a:t>2021/6/16</a:t>
             </a:fld>
             <a:endParaRPr kumimoji="1" lang="ja-JP" altLang="en-US"/>
           </a:p>
@@ -2629,7 +2629,7 @@
           <a:p>
             <a:fld id="{1D05365D-45E7-44A0-87EE-3ACBB8194AED}" type="datetimeFigureOut">
               <a:rPr kumimoji="1" lang="ja-JP" altLang="en-US" smtClean="0"/>
-              <a:t>2021/6/3</a:t>
+              <a:t>2021/6/16</a:t>
             </a:fld>
             <a:endParaRPr kumimoji="1" lang="ja-JP" altLang="en-US"/>
           </a:p>
@@ -2962,7 +2962,7 @@
           <a:p>
             <a:fld id="{1D05365D-45E7-44A0-87EE-3ACBB8194AED}" type="datetimeFigureOut">
               <a:rPr kumimoji="1" lang="ja-JP" altLang="en-US" smtClean="0"/>
-              <a:t>2021/6/3</a:t>
+              <a:t>2021/6/16</a:t>
             </a:fld>
             <a:endParaRPr kumimoji="1" lang="ja-JP" altLang="en-US"/>
           </a:p>
@@ -3243,7 +3243,7 @@
           <a:p>
             <a:fld id="{1D05365D-45E7-44A0-87EE-3ACBB8194AED}" type="datetimeFigureOut">
               <a:rPr kumimoji="1" lang="ja-JP" altLang="en-US" smtClean="0"/>
-              <a:t>2021/6/3</a:t>
+              <a:t>2021/6/16</a:t>
             </a:fld>
             <a:endParaRPr kumimoji="1" lang="ja-JP" altLang="en-US"/>
           </a:p>
@@ -3486,8 +3486,8 @@
         </p:nvSpPr>
         <p:spPr>
           <a:xfrm>
-            <a:off x="4048761" y="6577710"/>
-            <a:ext cx="4094480" cy="293548"/>
+            <a:off x="4048761" y="6577709"/>
+            <a:ext cx="4094480" cy="317419"/>
           </a:xfrm>
           <a:prstGeom prst="rect">
             <a:avLst/>
@@ -3609,8 +3609,8 @@
         </p:nvSpPr>
         <p:spPr>
           <a:xfrm>
-            <a:off x="1" y="6577710"/>
-            <a:ext cx="4094480" cy="293548"/>
+            <a:off x="-60960" y="6577710"/>
+            <a:ext cx="4155441" cy="317420"/>
           </a:xfrm>
           <a:prstGeom prst="rect">
             <a:avLst/>
@@ -3767,8 +3767,8 @@
         </p:nvSpPr>
         <p:spPr>
           <a:xfrm>
-            <a:off x="8097521" y="6577710"/>
-            <a:ext cx="4094480" cy="293548"/>
+            <a:off x="8097520" y="6577709"/>
+            <a:ext cx="4155439" cy="317419"/>
           </a:xfrm>
           <a:prstGeom prst="rect">
             <a:avLst/>
@@ -3988,8 +3988,8 @@
         </p:nvSpPr>
         <p:spPr>
           <a:xfrm>
-            <a:off x="6096000" y="-1731"/>
-            <a:ext cx="6096001" cy="292348"/>
+            <a:off x="6096000" y="-39616"/>
+            <a:ext cx="6156960" cy="330233"/>
           </a:xfrm>
           <a:prstGeom prst="rect">
             <a:avLst/>
@@ -4068,8 +4068,8 @@
         </p:nvSpPr>
         <p:spPr>
           <a:xfrm>
-            <a:off x="0" y="1199"/>
-            <a:ext cx="6096000" cy="289417"/>
+            <a:off x="-60960" y="-39615"/>
+            <a:ext cx="6156960" cy="330232"/>
           </a:xfrm>
           <a:prstGeom prst="rect">
             <a:avLst/>
@@ -4985,7 +4985,10 @@
           <a:bodyPr/>
           <a:lstStyle/>
           <a:p>
-            <a:endParaRPr kumimoji="1" lang="ja-JP" altLang="en-US" dirty="0"/>
+            <a:r>
+              <a:rPr kumimoji="1" lang="ja-JP" altLang="en-US" dirty="0"/>
+              <a:t>あ</a:t>
+            </a:r>
           </a:p>
         </p:txBody>
       </p:sp>

</xml_diff>